<commit_message>
Update overview graphic to put "wavelength embeddings" from top
</commit_message>
<xml_diff>
--- a/static/images/overview.pptx
+++ b/static/images/overview.pptx
@@ -104,6 +104,11 @@
       </a:defRPr>
     </a:lvl9pPr>
   </p:defaultTextStyle>
+  <p:extLst>
+    <p:ext uri="{EFAFB233-063F-42B5-8137-9DF3F51BA10A}">
+      <p15:sldGuideLst xmlns:p15="http://schemas.microsoft.com/office/powerpoint/2012/main"/>
+    </p:ext>
+  </p:extLst>
 </p:presentation>
 </file>
 
@@ -3502,16 +3507,17 @@
           </p:cNvPr>
           <p:cNvCxnSpPr>
             <a:cxnSpLocks/>
+            <a:stCxn id="13" idx="2"/>
             <a:endCxn id="14" idx="0"/>
           </p:cNvCxnSpPr>
           <p:nvPr/>
         </p:nvCxnSpPr>
         <p:spPr>
           <a:xfrm>
-            <a:off x="445765" y="496132"/>
-            <a:ext cx="3731062" cy="307776"/>
+            <a:off x="4176827" y="525673"/>
+            <a:ext cx="0" cy="278235"/>
           </a:xfrm>
-          <a:prstGeom prst="bentConnector2">
+          <a:prstGeom prst="straightConnector1">
             <a:avLst/>
           </a:prstGeom>
           <a:ln w="12700">
@@ -3550,7 +3556,7 @@
         </p:nvSpPr>
         <p:spPr>
           <a:xfrm>
-            <a:off x="331611" y="43744"/>
+            <a:off x="3662477" y="64008"/>
             <a:ext cx="1028700" cy="461665"/>
           </a:xfrm>
           <a:prstGeom prst="rect">
@@ -3675,7 +3681,7 @@
         </p:nvSpPr>
         <p:spPr>
           <a:xfrm>
-            <a:off x="3710964" y="1745333"/>
+            <a:off x="3710962" y="1766989"/>
             <a:ext cx="931729" cy="461665"/>
           </a:xfrm>
           <a:prstGeom prst="rect">
@@ -3735,7 +3741,7 @@
         <p:spPr>
           <a:xfrm flipV="1">
             <a:off x="4176827" y="1489708"/>
-            <a:ext cx="0" cy="255624"/>
+            <a:ext cx="0" cy="277281"/>
           </a:xfrm>
           <a:prstGeom prst="straightConnector1">
             <a:avLst/>

</xml_diff>